<commit_message>
Add updated presentation file
</commit_message>
<xml_diff>
--- a/Isaac_Fonseca/Creditcard_fraud_IF.pptx
+++ b/Isaac_Fonseca/Creditcard_fraud_IF.pptx
@@ -10,7 +10,7 @@
     <p:sldMasterId id="2147483726" r:id="rId6"/>
   </p:sldMasterIdLst>
   <p:notesMasterIdLst>
-    <p:notesMasterId r:id="rId20"/>
+    <p:notesMasterId r:id="rId19"/>
   </p:notesMasterIdLst>
   <p:sldIdLst>
     <p:sldId id="256" r:id="rId7"/>
@@ -18,14 +18,13 @@
     <p:sldId id="258" r:id="rId9"/>
     <p:sldId id="260" r:id="rId10"/>
     <p:sldId id="261" r:id="rId11"/>
-    <p:sldId id="259" r:id="rId12"/>
-    <p:sldId id="271" r:id="rId13"/>
-    <p:sldId id="272" r:id="rId14"/>
-    <p:sldId id="262" r:id="rId15"/>
-    <p:sldId id="269" r:id="rId16"/>
-    <p:sldId id="270" r:id="rId17"/>
-    <p:sldId id="267" r:id="rId18"/>
-    <p:sldId id="268" r:id="rId19"/>
+    <p:sldId id="271" r:id="rId12"/>
+    <p:sldId id="272" r:id="rId13"/>
+    <p:sldId id="262" r:id="rId14"/>
+    <p:sldId id="269" r:id="rId15"/>
+    <p:sldId id="270" r:id="rId16"/>
+    <p:sldId id="267" r:id="rId17"/>
+    <p:sldId id="268" r:id="rId18"/>
   </p:sldIdLst>
   <p:sldSz cx="12192000" cy="6858000"/>
   <p:notesSz cx="7772400" cy="10058400"/>
@@ -124,6 +123,11 @@
       </a:defRPr>
     </a:lvl9pPr>
   </p:defaultTextStyle>
+  <p:extLst>
+    <p:ext uri="{EFAFB233-063F-42B5-8137-9DF3F51BA10A}">
+      <p15:sldGuideLst xmlns:p15="http://schemas.microsoft.com/office/powerpoint/2012/main"/>
+    </p:ext>
+  </p:extLst>
 </p:presentation>
 </file>
 
@@ -13081,136 +13085,6 @@
         <p:cNvPr id="1" name="">
           <a:extLst>
             <a:ext uri="{FF2B5EF4-FFF2-40B4-BE49-F238E27FC236}">
-              <a16:creationId xmlns:a16="http://schemas.microsoft.com/office/drawing/2014/main" id="{7000973F-5875-1A65-8338-AA59C87A24C9}"/>
-            </a:ext>
-          </a:extLst>
-        </p:cNvPr>
-        <p:cNvGrpSpPr/>
-        <p:nvPr/>
-      </p:nvGrpSpPr>
-      <p:grpSpPr>
-        <a:xfrm>
-          <a:off x="0" y="0"/>
-          <a:ext cx="0" cy="0"/>
-          <a:chOff x="0" y="0"/>
-          <a:chExt cx="0" cy="0"/>
-        </a:xfrm>
-      </p:grpSpPr>
-      <p:sp>
-        <p:nvSpPr>
-          <p:cNvPr id="290" name="CustomShape 1">
-            <a:extLst>
-              <a:ext uri="{FF2B5EF4-FFF2-40B4-BE49-F238E27FC236}">
-                <a16:creationId xmlns:a16="http://schemas.microsoft.com/office/drawing/2014/main" id="{73C54FB1-3A4D-E7E9-7952-07F16E6F8560}"/>
-              </a:ext>
-            </a:extLst>
-          </p:cNvPr>
-          <p:cNvSpPr/>
-          <p:nvPr/>
-        </p:nvSpPr>
-        <p:spPr>
-          <a:xfrm>
-            <a:off x="1185960" y="224655"/>
-            <a:ext cx="9820080" cy="912600"/>
-          </a:xfrm>
-          <a:prstGeom prst="rect">
-            <a:avLst/>
-          </a:prstGeom>
-          <a:noFill/>
-          <a:ln>
-            <a:noFill/>
-          </a:ln>
-        </p:spPr>
-        <p:style>
-          <a:lnRef idx="0">
-            <a:scrgbClr r="0" g="0" b="0"/>
-          </a:lnRef>
-          <a:fillRef idx="0">
-            <a:scrgbClr r="0" g="0" b="0"/>
-          </a:fillRef>
-          <a:effectRef idx="0">
-            <a:scrgbClr r="0" g="0" b="0"/>
-          </a:effectRef>
-          <a:fontRef idx="minor"/>
-        </p:style>
-        <p:txBody>
-          <a:bodyPr lIns="0" tIns="0" rIns="0" bIns="0">
-            <a:noAutofit/>
-          </a:bodyPr>
-          <a:lstStyle/>
-          <a:p>
-            <a:pPr>
-              <a:lnSpc>
-                <a:spcPct val="90000"/>
-              </a:lnSpc>
-            </a:pPr>
-            <a:r>
-              <a:rPr lang="en-US" sz="3200" b="0" strike="noStrike" cap="all" spc="287" dirty="0">
-                <a:solidFill>
-                  <a:srgbClr val="000000"/>
-                </a:solidFill>
-                <a:latin typeface="Posterama"/>
-                <a:ea typeface="DejaVu Sans"/>
-              </a:rPr>
-              <a:t>Predictive Models XGB Test data</a:t>
-            </a:r>
-            <a:endParaRPr lang="en-US" sz="3200" b="0" strike="noStrike" spc="-1" dirty="0">
-              <a:latin typeface="Arial"/>
-            </a:endParaRPr>
-          </a:p>
-        </p:txBody>
-      </p:sp>
-      <p:pic>
-        <p:nvPicPr>
-          <p:cNvPr id="3" name="Picture 2">
-            <a:extLst>
-              <a:ext uri="{FF2B5EF4-FFF2-40B4-BE49-F238E27FC236}">
-                <a16:creationId xmlns:a16="http://schemas.microsoft.com/office/drawing/2014/main" id="{12320347-4B3F-37C3-0BEC-BB20F5552EA3}"/>
-              </a:ext>
-            </a:extLst>
-          </p:cNvPr>
-          <p:cNvPicPr>
-            <a:picLocks noChangeAspect="1"/>
-          </p:cNvPicPr>
-          <p:nvPr/>
-        </p:nvPicPr>
-        <p:blipFill>
-          <a:blip r:embed="rId2"/>
-          <a:stretch>
-            <a:fillRect/>
-          </a:stretch>
-        </p:blipFill>
-        <p:spPr>
-          <a:xfrm>
-            <a:off x="757958" y="1016573"/>
-            <a:ext cx="7436232" cy="3638737"/>
-          </a:xfrm>
-          <a:prstGeom prst="rect">
-            <a:avLst/>
-          </a:prstGeom>
-        </p:spPr>
-      </p:pic>
-    </p:spTree>
-    <p:extLst>
-      <p:ext uri="{BB962C8B-B14F-4D97-AF65-F5344CB8AC3E}">
-        <p14:creationId xmlns:p14="http://schemas.microsoft.com/office/powerpoint/2010/main" val="410439821"/>
-      </p:ext>
-    </p:extLst>
-  </p:cSld>
-  <p:clrMapOvr>
-    <a:masterClrMapping/>
-  </p:clrMapOvr>
-</p:sld>
-</file>
-
-<file path=ppt/slides/slide11.xml><?xml version="1.0" encoding="utf-8"?>
-<p:sld xmlns:a="http://schemas.openxmlformats.org/drawingml/2006/main" xmlns:r="http://schemas.openxmlformats.org/officeDocument/2006/relationships" xmlns:p="http://schemas.openxmlformats.org/presentationml/2006/main">
-  <p:cSld>
-    <p:spTree>
-      <p:nvGrpSpPr>
-        <p:cNvPr id="1" name="">
-          <a:extLst>
-            <a:ext uri="{FF2B5EF4-FFF2-40B4-BE49-F238E27FC236}">
               <a16:creationId xmlns:a16="http://schemas.microsoft.com/office/drawing/2014/main" id="{4D693D46-7285-8716-2BD1-2C5A24F8B26A}"/>
             </a:ext>
           </a:extLst>
@@ -13339,7 +13213,7 @@
 </p:sld>
 </file>
 
-<file path=ppt/slides/slide12.xml><?xml version="1.0" encoding="utf-8"?>
+<file path=ppt/slides/slide11.xml><?xml version="1.0" encoding="utf-8"?>
 <p:sld xmlns:a="http://schemas.openxmlformats.org/drawingml/2006/main" xmlns:r="http://schemas.openxmlformats.org/officeDocument/2006/relationships" xmlns:p="http://schemas.openxmlformats.org/presentationml/2006/main">
   <p:cSld>
     <p:spTree>
@@ -13461,7 +13335,7 @@
 </p:sld>
 </file>
 
-<file path=ppt/slides/slide13.xml><?xml version="1.0" encoding="utf-8"?>
+<file path=ppt/slides/slide12.xml><?xml version="1.0" encoding="utf-8"?>
 <p:sld xmlns:a="http://schemas.openxmlformats.org/drawingml/2006/main" xmlns:r="http://schemas.openxmlformats.org/officeDocument/2006/relationships" xmlns:p="http://schemas.openxmlformats.org/presentationml/2006/main">
   <p:cSld>
     <p:spTree>
@@ -14598,162 +14472,6 @@
   <p:cSld>
     <p:spTree>
       <p:nvGrpSpPr>
-        <p:cNvPr id="1" name=""/>
-        <p:cNvGrpSpPr/>
-        <p:nvPr/>
-      </p:nvGrpSpPr>
-      <p:grpSpPr>
-        <a:xfrm>
-          <a:off x="0" y="0"/>
-          <a:ext cx="0" cy="0"/>
-          <a:chOff x="0" y="0"/>
-          <a:chExt cx="0" cy="0"/>
-        </a:xfrm>
-      </p:grpSpPr>
-      <p:pic>
-        <p:nvPicPr>
-          <p:cNvPr id="282" name="Picture 281"/>
-          <p:cNvPicPr/>
-          <p:nvPr/>
-        </p:nvPicPr>
-        <p:blipFill>
-          <a:blip r:embed="rId2"/>
-          <a:stretch/>
-        </p:blipFill>
-        <p:spPr>
-          <a:xfrm>
-            <a:off x="2936286" y="2390901"/>
-            <a:ext cx="4350240" cy="3474000"/>
-          </a:xfrm>
-          <a:prstGeom prst="rect">
-            <a:avLst/>
-          </a:prstGeom>
-          <a:ln>
-            <a:noFill/>
-          </a:ln>
-        </p:spPr>
-      </p:pic>
-      <p:sp>
-        <p:nvSpPr>
-          <p:cNvPr id="283" name="CustomShape 1"/>
-          <p:cNvSpPr/>
-          <p:nvPr/>
-        </p:nvSpPr>
-        <p:spPr>
-          <a:xfrm>
-            <a:off x="821104" y="708312"/>
-            <a:ext cx="9235080" cy="1445096"/>
-          </a:xfrm>
-          <a:prstGeom prst="rect">
-            <a:avLst/>
-          </a:prstGeom>
-          <a:noFill/>
-          <a:ln>
-            <a:noFill/>
-          </a:ln>
-        </p:spPr>
-        <p:style>
-          <a:lnRef idx="0">
-            <a:scrgbClr r="0" g="0" b="0"/>
-          </a:lnRef>
-          <a:fillRef idx="0">
-            <a:scrgbClr r="0" g="0" b="0"/>
-          </a:fillRef>
-          <a:effectRef idx="0">
-            <a:scrgbClr r="0" g="0" b="0"/>
-          </a:effectRef>
-          <a:fontRef idx="minor"/>
-        </p:style>
-        <p:txBody>
-          <a:bodyPr lIns="90000" tIns="45000" rIns="90000" bIns="45000">
-            <a:spAutoFit/>
-          </a:bodyPr>
-          <a:lstStyle/>
-          <a:p>
-            <a:pPr>
-              <a:lnSpc>
-                <a:spcPct val="100000"/>
-              </a:lnSpc>
-            </a:pPr>
-            <a:r>
-              <a:rPr lang="en-US" sz="3200" b="0" strike="noStrike" cap="all" spc="287" dirty="0">
-                <a:solidFill>
-                  <a:srgbClr val="000000"/>
-                </a:solidFill>
-                <a:latin typeface="Posterama"/>
-                <a:ea typeface="DejaVu Sans"/>
-              </a:rPr>
-              <a:t>distribution of sub sample classes Add Smote </a:t>
-            </a:r>
-            <a:r>
-              <a:rPr lang="en-US" sz="3200" b="0" strike="noStrike" cap="all" spc="287" dirty="0" err="1">
-                <a:solidFill>
-                  <a:srgbClr val="000000"/>
-                </a:solidFill>
-                <a:latin typeface="Posterama"/>
-                <a:ea typeface="DejaVu Sans"/>
-              </a:rPr>
-              <a:t>SMOteenn</a:t>
-            </a:r>
-            <a:endParaRPr lang="en-US" sz="3200" b="0" strike="noStrike" spc="-1" dirty="0">
-              <a:latin typeface="Arial"/>
-            </a:endParaRPr>
-          </a:p>
-          <a:p>
-            <a:pPr>
-              <a:lnSpc>
-                <a:spcPct val="100000"/>
-              </a:lnSpc>
-            </a:pPr>
-            <a:r>
-              <a:rPr lang="en-US" sz="1200" b="0" strike="noStrike" cap="all" spc="287" dirty="0">
-                <a:solidFill>
-                  <a:srgbClr val="000000"/>
-                </a:solidFill>
-                <a:latin typeface="Posterama"/>
-                <a:ea typeface="DejaVu Sans"/>
-              </a:rPr>
-              <a:t>0  0.577465</a:t>
-            </a:r>
-            <a:endParaRPr lang="en-US" sz="1200" b="0" strike="noStrike" spc="-1" dirty="0">
-              <a:latin typeface="Arial"/>
-            </a:endParaRPr>
-          </a:p>
-          <a:p>
-            <a:pPr>
-              <a:lnSpc>
-                <a:spcPct val="100000"/>
-              </a:lnSpc>
-            </a:pPr>
-            <a:r>
-              <a:rPr lang="en-US" sz="1200" b="0" strike="noStrike" cap="all" spc="287" dirty="0">
-                <a:solidFill>
-                  <a:srgbClr val="000000"/>
-                </a:solidFill>
-                <a:latin typeface="Posterama"/>
-                <a:ea typeface="DejaVu Sans"/>
-              </a:rPr>
-              <a:t>1  0.422535</a:t>
-            </a:r>
-            <a:endParaRPr lang="en-US" sz="1200" b="0" strike="noStrike" spc="-1" dirty="0">
-              <a:latin typeface="Arial"/>
-            </a:endParaRPr>
-          </a:p>
-        </p:txBody>
-      </p:sp>
-    </p:spTree>
-  </p:cSld>
-  <p:clrMapOvr>
-    <a:masterClrMapping/>
-  </p:clrMapOvr>
-</p:sld>
-</file>
-
-<file path=ppt/slides/slide7.xml><?xml version="1.0" encoding="utf-8"?>
-<p:sld xmlns:a="http://schemas.openxmlformats.org/drawingml/2006/main" xmlns:r="http://schemas.openxmlformats.org/officeDocument/2006/relationships" xmlns:p="http://schemas.openxmlformats.org/presentationml/2006/main">
-  <p:cSld>
-    <p:spTree>
-      <p:nvGrpSpPr>
         <p:cNvPr id="1" name="">
           <a:extLst>
             <a:ext uri="{FF2B5EF4-FFF2-40B4-BE49-F238E27FC236}">
@@ -14926,7 +14644,7 @@
 </p:sld>
 </file>
 
-<file path=ppt/slides/slide8.xml><?xml version="1.0" encoding="utf-8"?>
+<file path=ppt/slides/slide7.xml><?xml version="1.0" encoding="utf-8"?>
 <p:sld xmlns:a="http://schemas.openxmlformats.org/drawingml/2006/main" xmlns:r="http://schemas.openxmlformats.org/officeDocument/2006/relationships" xmlns:p="http://schemas.openxmlformats.org/presentationml/2006/main">
   <p:cSld>
     <p:spTree>
@@ -15066,7 +14784,7 @@
 </p:sld>
 </file>
 
-<file path=ppt/slides/slide9.xml><?xml version="1.0" encoding="utf-8"?>
+<file path=ppt/slides/slide8.xml><?xml version="1.0" encoding="utf-8"?>
 <p:sld xmlns:a="http://schemas.openxmlformats.org/drawingml/2006/main" xmlns:r="http://schemas.openxmlformats.org/officeDocument/2006/relationships" xmlns:p="http://schemas.openxmlformats.org/presentationml/2006/main">
   <p:cSld>
     <p:spTree>
@@ -15163,8 +14881,8 @@
         </p:blipFill>
         <p:spPr>
           <a:xfrm>
-            <a:off x="0" y="685405"/>
-            <a:ext cx="12192000" cy="5947940"/>
+            <a:off x="262119" y="792163"/>
+            <a:ext cx="11667761" cy="5692187"/>
           </a:xfrm>
           <a:prstGeom prst="rect">
             <a:avLst/>
@@ -15172,6 +14890,136 @@
         </p:spPr>
       </p:pic>
     </p:spTree>
+  </p:cSld>
+  <p:clrMapOvr>
+    <a:masterClrMapping/>
+  </p:clrMapOvr>
+</p:sld>
+</file>
+
+<file path=ppt/slides/slide9.xml><?xml version="1.0" encoding="utf-8"?>
+<p:sld xmlns:a="http://schemas.openxmlformats.org/drawingml/2006/main" xmlns:r="http://schemas.openxmlformats.org/officeDocument/2006/relationships" xmlns:p="http://schemas.openxmlformats.org/presentationml/2006/main">
+  <p:cSld>
+    <p:spTree>
+      <p:nvGrpSpPr>
+        <p:cNvPr id="1" name="">
+          <a:extLst>
+            <a:ext uri="{FF2B5EF4-FFF2-40B4-BE49-F238E27FC236}">
+              <a16:creationId xmlns:a16="http://schemas.microsoft.com/office/drawing/2014/main" id="{7000973F-5875-1A65-8338-AA59C87A24C9}"/>
+            </a:ext>
+          </a:extLst>
+        </p:cNvPr>
+        <p:cNvGrpSpPr/>
+        <p:nvPr/>
+      </p:nvGrpSpPr>
+      <p:grpSpPr>
+        <a:xfrm>
+          <a:off x="0" y="0"/>
+          <a:ext cx="0" cy="0"/>
+          <a:chOff x="0" y="0"/>
+          <a:chExt cx="0" cy="0"/>
+        </a:xfrm>
+      </p:grpSpPr>
+      <p:sp>
+        <p:nvSpPr>
+          <p:cNvPr id="290" name="CustomShape 1">
+            <a:extLst>
+              <a:ext uri="{FF2B5EF4-FFF2-40B4-BE49-F238E27FC236}">
+                <a16:creationId xmlns:a16="http://schemas.microsoft.com/office/drawing/2014/main" id="{73C54FB1-3A4D-E7E9-7952-07F16E6F8560}"/>
+              </a:ext>
+            </a:extLst>
+          </p:cNvPr>
+          <p:cNvSpPr/>
+          <p:nvPr/>
+        </p:nvSpPr>
+        <p:spPr>
+          <a:xfrm>
+            <a:off x="1185960" y="224655"/>
+            <a:ext cx="9820080" cy="912600"/>
+          </a:xfrm>
+          <a:prstGeom prst="rect">
+            <a:avLst/>
+          </a:prstGeom>
+          <a:noFill/>
+          <a:ln>
+            <a:noFill/>
+          </a:ln>
+        </p:spPr>
+        <p:style>
+          <a:lnRef idx="0">
+            <a:scrgbClr r="0" g="0" b="0"/>
+          </a:lnRef>
+          <a:fillRef idx="0">
+            <a:scrgbClr r="0" g="0" b="0"/>
+          </a:fillRef>
+          <a:effectRef idx="0">
+            <a:scrgbClr r="0" g="0" b="0"/>
+          </a:effectRef>
+          <a:fontRef idx="minor"/>
+        </p:style>
+        <p:txBody>
+          <a:bodyPr lIns="0" tIns="0" rIns="0" bIns="0">
+            <a:noAutofit/>
+          </a:bodyPr>
+          <a:lstStyle/>
+          <a:p>
+            <a:pPr>
+              <a:lnSpc>
+                <a:spcPct val="90000"/>
+              </a:lnSpc>
+            </a:pPr>
+            <a:r>
+              <a:rPr lang="en-US" sz="3200" b="0" strike="noStrike" cap="all" spc="287" dirty="0">
+                <a:solidFill>
+                  <a:srgbClr val="000000"/>
+                </a:solidFill>
+                <a:latin typeface="Posterama"/>
+                <a:ea typeface="DejaVu Sans"/>
+              </a:rPr>
+              <a:t>Predictive Models XGB Test data</a:t>
+            </a:r>
+            <a:endParaRPr lang="en-US" sz="3200" b="0" strike="noStrike" spc="-1" dirty="0">
+              <a:latin typeface="Arial"/>
+            </a:endParaRPr>
+          </a:p>
+        </p:txBody>
+      </p:sp>
+      <p:pic>
+        <p:nvPicPr>
+          <p:cNvPr id="4" name="Picture 3">
+            <a:extLst>
+              <a:ext uri="{FF2B5EF4-FFF2-40B4-BE49-F238E27FC236}">
+                <a16:creationId xmlns:a16="http://schemas.microsoft.com/office/drawing/2014/main" id="{ADB4D8DA-EA38-E8DC-4C01-99802E76CD38}"/>
+              </a:ext>
+            </a:extLst>
+          </p:cNvPr>
+          <p:cNvPicPr>
+            <a:picLocks noChangeAspect="1"/>
+          </p:cNvPicPr>
+          <p:nvPr/>
+        </p:nvPicPr>
+        <p:blipFill>
+          <a:blip r:embed="rId2"/>
+          <a:stretch>
+            <a:fillRect/>
+          </a:stretch>
+        </p:blipFill>
+        <p:spPr>
+          <a:xfrm>
+            <a:off x="464291" y="762937"/>
+            <a:ext cx="7352206" cy="5725570"/>
+          </a:xfrm>
+          <a:prstGeom prst="rect">
+            <a:avLst/>
+          </a:prstGeom>
+        </p:spPr>
+      </p:pic>
+    </p:spTree>
+    <p:extLst>
+      <p:ext uri="{BB962C8B-B14F-4D97-AF65-F5344CB8AC3E}">
+        <p14:creationId xmlns:p14="http://schemas.microsoft.com/office/powerpoint/2010/main" val="410439821"/>
+      </p:ext>
+    </p:extLst>
   </p:cSld>
   <p:clrMapOvr>
     <a:masterClrMapping/>

</xml_diff>